<commit_message>
continue to rework chapters. Rename gems chapter to events chapter...
</commit_message>
<xml_diff>
--- a/images/survival-kit/shiny-find-inputs.pptx
+++ b/images/survival-kit/shiny-find-inputs.pptx
@@ -104,6 +104,11 @@
       </a:defRPr>
     </a:lvl9pPr>
   </p:defaultTextStyle>
+  <p:extLst>
+    <p:ext uri="{EFAFB233-063F-42B5-8137-9DF3F51BA10A}">
+      <p15:sldGuideLst xmlns:p15="http://schemas.microsoft.com/office/powerpoint/2012/main"/>
+    </p:ext>
+  </p:extLst>
 </p:presentation>
 </file>
 
@@ -256,7 +261,7 @@
           <a:p>
             <a:fld id="{0E87A9B6-BDFA-3342-AAEF-EA026AF75D2C}" type="datetimeFigureOut">
               <a:rPr lang="en-CH" smtClean="0"/>
-              <a:t>17.05.20</a:t>
+              <a:t>07.03.21</a:t>
             </a:fld>
             <a:endParaRPr lang="en-CH"/>
           </a:p>
@@ -456,7 +461,7 @@
           <a:p>
             <a:fld id="{0E87A9B6-BDFA-3342-AAEF-EA026AF75D2C}" type="datetimeFigureOut">
               <a:rPr lang="en-CH" smtClean="0"/>
-              <a:t>17.05.20</a:t>
+              <a:t>07.03.21</a:t>
             </a:fld>
             <a:endParaRPr lang="en-CH"/>
           </a:p>
@@ -666,7 +671,7 @@
           <a:p>
             <a:fld id="{0E87A9B6-BDFA-3342-AAEF-EA026AF75D2C}" type="datetimeFigureOut">
               <a:rPr lang="en-CH" smtClean="0"/>
-              <a:t>17.05.20</a:t>
+              <a:t>07.03.21</a:t>
             </a:fld>
             <a:endParaRPr lang="en-CH"/>
           </a:p>
@@ -866,7 +871,7 @@
           <a:p>
             <a:fld id="{0E87A9B6-BDFA-3342-AAEF-EA026AF75D2C}" type="datetimeFigureOut">
               <a:rPr lang="en-CH" smtClean="0"/>
-              <a:t>17.05.20</a:t>
+              <a:t>07.03.21</a:t>
             </a:fld>
             <a:endParaRPr lang="en-CH"/>
           </a:p>
@@ -1142,7 +1147,7 @@
           <a:p>
             <a:fld id="{0E87A9B6-BDFA-3342-AAEF-EA026AF75D2C}" type="datetimeFigureOut">
               <a:rPr lang="en-CH" smtClean="0"/>
-              <a:t>17.05.20</a:t>
+              <a:t>07.03.21</a:t>
             </a:fld>
             <a:endParaRPr lang="en-CH"/>
           </a:p>
@@ -1410,7 +1415,7 @@
           <a:p>
             <a:fld id="{0E87A9B6-BDFA-3342-AAEF-EA026AF75D2C}" type="datetimeFigureOut">
               <a:rPr lang="en-CH" smtClean="0"/>
-              <a:t>17.05.20</a:t>
+              <a:t>07.03.21</a:t>
             </a:fld>
             <a:endParaRPr lang="en-CH"/>
           </a:p>
@@ -1825,7 +1830,7 @@
           <a:p>
             <a:fld id="{0E87A9B6-BDFA-3342-AAEF-EA026AF75D2C}" type="datetimeFigureOut">
               <a:rPr lang="en-CH" smtClean="0"/>
-              <a:t>17.05.20</a:t>
+              <a:t>07.03.21</a:t>
             </a:fld>
             <a:endParaRPr lang="en-CH"/>
           </a:p>
@@ -1967,7 +1972,7 @@
           <a:p>
             <a:fld id="{0E87A9B6-BDFA-3342-AAEF-EA026AF75D2C}" type="datetimeFigureOut">
               <a:rPr lang="en-CH" smtClean="0"/>
-              <a:t>17.05.20</a:t>
+              <a:t>07.03.21</a:t>
             </a:fld>
             <a:endParaRPr lang="en-CH"/>
           </a:p>
@@ -2080,7 +2085,7 @@
           <a:p>
             <a:fld id="{0E87A9B6-BDFA-3342-AAEF-EA026AF75D2C}" type="datetimeFigureOut">
               <a:rPr lang="en-CH" smtClean="0"/>
-              <a:t>17.05.20</a:t>
+              <a:t>07.03.21</a:t>
             </a:fld>
             <a:endParaRPr lang="en-CH"/>
           </a:p>
@@ -2393,7 +2398,7 @@
           <a:p>
             <a:fld id="{0E87A9B6-BDFA-3342-AAEF-EA026AF75D2C}" type="datetimeFigureOut">
               <a:rPr lang="en-CH" smtClean="0"/>
-              <a:t>17.05.20</a:t>
+              <a:t>07.03.21</a:t>
             </a:fld>
             <a:endParaRPr lang="en-CH"/>
           </a:p>
@@ -2682,7 +2687,7 @@
           <a:p>
             <a:fld id="{0E87A9B6-BDFA-3342-AAEF-EA026AF75D2C}" type="datetimeFigureOut">
               <a:rPr lang="en-CH" smtClean="0"/>
-              <a:t>17.05.20</a:t>
+              <a:t>07.03.21</a:t>
             </a:fld>
             <a:endParaRPr lang="en-CH"/>
           </a:p>
@@ -2925,7 +2930,7 @@
           <a:p>
             <a:fld id="{0E87A9B6-BDFA-3342-AAEF-EA026AF75D2C}" type="datetimeFigureOut">
               <a:rPr lang="en-CH" smtClean="0"/>
-              <a:t>17.05.20</a:t>
+              <a:t>07.03.21</a:t>
             </a:fld>
             <a:endParaRPr lang="en-CH"/>
           </a:p>
@@ -3670,10 +3675,10 @@
       </p:sp>
       <p:cxnSp>
         <p:nvCxnSpPr>
-          <p:cNvPr id="13" name="Straight Arrow Connector 12">
-            <a:extLst>
-              <a:ext uri="{FF2B5EF4-FFF2-40B4-BE49-F238E27FC236}">
-                <a16:creationId xmlns:a16="http://schemas.microsoft.com/office/drawing/2014/main" id="{FA8D5886-E4D1-6D40-863C-5B49BC16D202}"/>
+          <p:cNvPr id="14" name="Straight Arrow Connector 13">
+            <a:extLst>
+              <a:ext uri="{FF2B5EF4-FFF2-40B4-BE49-F238E27FC236}">
+                <a16:creationId xmlns:a16="http://schemas.microsoft.com/office/drawing/2014/main" id="{FD8FCD7D-3A7F-5740-A23C-9275C2037A4C}"/>
               </a:ext>
             </a:extLst>
           </p:cNvPr>
@@ -3683,16 +3688,16 @@
           <p:nvPr/>
         </p:nvCxnSpPr>
         <p:spPr>
-          <a:xfrm>
-            <a:off x="3038558" y="2795125"/>
-            <a:ext cx="2981313" cy="1972478"/>
+          <a:xfrm flipH="1">
+            <a:off x="6186153" y="2904203"/>
+            <a:ext cx="3740613" cy="1874749"/>
           </a:xfrm>
           <a:prstGeom prst="straightConnector1">
             <a:avLst/>
           </a:prstGeom>
           <a:ln w="63500">
             <a:solidFill>
-              <a:srgbClr val="00B050"/>
+              <a:schemeClr val="tx1"/>
             </a:solidFill>
             <a:headEnd type="triangle"/>
             <a:tailEnd type="triangle"/>
@@ -3713,51 +3718,6 @@
           </a:fontRef>
         </p:style>
       </p:cxnSp>
-      <p:cxnSp>
-        <p:nvCxnSpPr>
-          <p:cNvPr id="14" name="Straight Arrow Connector 13">
-            <a:extLst>
-              <a:ext uri="{FF2B5EF4-FFF2-40B4-BE49-F238E27FC236}">
-                <a16:creationId xmlns:a16="http://schemas.microsoft.com/office/drawing/2014/main" id="{FD8FCD7D-3A7F-5740-A23C-9275C2037A4C}"/>
-              </a:ext>
-            </a:extLst>
-          </p:cNvPr>
-          <p:cNvCxnSpPr>
-            <a:cxnSpLocks/>
-          </p:cNvCxnSpPr>
-          <p:nvPr/>
-        </p:nvCxnSpPr>
-        <p:spPr>
-          <a:xfrm>
-            <a:off x="6345691" y="2795125"/>
-            <a:ext cx="0" cy="2055826"/>
-          </a:xfrm>
-          <a:prstGeom prst="straightConnector1">
-            <a:avLst/>
-          </a:prstGeom>
-          <a:ln w="63500">
-            <a:solidFill>
-              <a:srgbClr val="00B050"/>
-            </a:solidFill>
-            <a:headEnd type="triangle"/>
-            <a:tailEnd type="triangle"/>
-          </a:ln>
-        </p:spPr>
-        <p:style>
-          <a:lnRef idx="1">
-            <a:schemeClr val="accent1"/>
-          </a:lnRef>
-          <a:fillRef idx="0">
-            <a:schemeClr val="accent1"/>
-          </a:fillRef>
-          <a:effectRef idx="0">
-            <a:schemeClr val="accent1"/>
-          </a:effectRef>
-          <a:fontRef idx="minor">
-            <a:schemeClr val="tx1"/>
-          </a:fontRef>
-        </p:style>
-      </p:cxnSp>
       <p:sp>
         <p:nvSpPr>
           <p:cNvPr id="17" name="TextBox 16">
@@ -3808,21 +3768,23 @@
           </p:cNvPr>
           <p:cNvCxnSpPr>
             <a:cxnSpLocks/>
-            <a:endCxn id="21" idx="2"/>
+            <a:stCxn id="22" idx="0"/>
           </p:cNvCxnSpPr>
           <p:nvPr/>
         </p:nvCxnSpPr>
         <p:spPr>
-          <a:xfrm flipV="1">
-            <a:off x="6715045" y="2833579"/>
-            <a:ext cx="3239351" cy="1879454"/>
+          <a:xfrm flipH="1" flipV="1">
+            <a:off x="3068484" y="2873811"/>
+            <a:ext cx="3111958" cy="1893792"/>
           </a:xfrm>
           <a:prstGeom prst="straightConnector1">
             <a:avLst/>
           </a:prstGeom>
           <a:ln w="38100">
             <a:solidFill>
-              <a:srgbClr val="C00000"/>
+              <a:schemeClr val="bg1">
+                <a:lumMod val="65000"/>
+              </a:schemeClr>
             </a:solidFill>
             <a:tailEnd type="triangle"/>
           </a:ln>
@@ -3856,7 +3818,7 @@
         </p:nvSpPr>
         <p:spPr>
           <a:xfrm>
-            <a:off x="10067339" y="2818609"/>
+            <a:off x="3138500" y="3244334"/>
             <a:ext cx="219318" cy="369332"/>
           </a:xfrm>
           <a:prstGeom prst="rect">
@@ -3873,7 +3835,9 @@
             <a:r>
               <a:rPr lang="en-CH" b="1" dirty="0">
                 <a:solidFill>
-                  <a:srgbClr val="C00000"/>
+                  <a:schemeClr val="bg1">
+                    <a:lumMod val="65000"/>
+                  </a:schemeClr>
                 </a:solidFill>
               </a:rPr>
               <a:t>?</a:t>
@@ -3910,18 +3874,10 @@
           <a:lstStyle/>
           <a:p>
             <a:r>
-              <a:rPr lang="en-GB" b="1" dirty="0">
-                <a:solidFill>
-                  <a:srgbClr val="C00000"/>
-                </a:solidFill>
-              </a:rPr>
+              <a:rPr lang="en-GB" b="1" dirty="0"/>
               <a:t>&lt;input … type="text"&gt;</a:t>
             </a:r>
-            <a:endParaRPr lang="en-CH" b="1" dirty="0">
-              <a:solidFill>
-                <a:srgbClr val="C00000"/>
-              </a:solidFill>
-            </a:endParaRPr>
+            <a:endParaRPr lang="en-CH" b="1" dirty="0"/>
           </a:p>
         </p:txBody>
       </p:sp>
@@ -3940,7 +3896,7 @@
         <p:spPr>
           <a:xfrm>
             <a:off x="4411368" y="4767603"/>
-            <a:ext cx="3573863" cy="369332"/>
+            <a:ext cx="3538148" cy="369332"/>
           </a:xfrm>
           <a:prstGeom prst="rect">
             <a:avLst/>
@@ -3957,7 +3913,7 @@
               <a:t>$(scope).find(</a:t>
             </a:r>
             <a:r>
-              <a:rPr lang="en-GB" b="1" dirty="0">
+              <a:rPr lang="en-GB" dirty="0">
                 <a:solidFill>
                   <a:srgbClr val="00B050"/>
                 </a:solidFill>
@@ -3965,24 +3921,16 @@
               <a:t>'</a:t>
             </a:r>
             <a:r>
-              <a:rPr lang="en-GB" b="1" dirty="0" err="1">
-                <a:solidFill>
-                  <a:srgbClr val="00B050"/>
-                </a:solidFill>
-              </a:rPr>
-              <a:t>input.js</a:t>
-            </a:r>
-            <a:r>
-              <a:rPr lang="en-GB" b="1" dirty="0">
-                <a:solidFill>
-                  <a:srgbClr val="00B050"/>
-                </a:solidFill>
-              </a:rPr>
-              <a:t>-range-slider</a:t>
-            </a:r>
-            <a:r>
               <a:rPr lang="en-GB" dirty="0"/>
-              <a:t>')</a:t>
+              <a:t> </a:t>
+            </a:r>
+            <a:r>
+              <a:rPr lang="en-GB" b="1" dirty="0"/>
+              <a:t>input[type="text"] '</a:t>
+            </a:r>
+            <a:r>
+              <a:rPr lang="en-GB" dirty="0"/>
+              <a:t>)</a:t>
             </a:r>
             <a:endParaRPr lang="en-CH" dirty="0"/>
           </a:p>
@@ -4018,7 +3966,9 @@
             <a:r>
               <a:rPr lang="en-GB" b="1" i="0" u="none" strike="noStrike" dirty="0">
                 <a:solidFill>
-                  <a:srgbClr val="00B050"/>
+                  <a:schemeClr val="bg1">
+                    <a:lumMod val="65000"/>
+                  </a:schemeClr>
                 </a:solidFill>
                 <a:effectLst/>
                 <a:latin typeface="SFMono-Regular"/>
@@ -4028,7 +3978,9 @@
             <a:r>
               <a:rPr lang="en-GB" b="1" i="0" u="none" strike="noStrike" dirty="0" err="1">
                 <a:solidFill>
-                  <a:srgbClr val="00B050"/>
+                  <a:schemeClr val="bg1">
+                    <a:lumMod val="65000"/>
+                  </a:schemeClr>
                 </a:solidFill>
                 <a:effectLst/>
                 <a:latin typeface="SFMono-Regular"/>
@@ -4038,7 +3990,9 @@
             <a:r>
               <a:rPr lang="en-GB" b="1" i="0" u="none" strike="noStrike" dirty="0">
                 <a:solidFill>
-                  <a:srgbClr val="00B050"/>
+                  <a:schemeClr val="bg1">
+                    <a:lumMod val="65000"/>
+                  </a:schemeClr>
                 </a:solidFill>
                 <a:effectLst/>
                 <a:latin typeface="SFMono-Regular"/>
@@ -4047,7 +4001,9 @@
             </a:r>
             <a:endParaRPr lang="en-CH" b="1" dirty="0">
               <a:solidFill>
-                <a:srgbClr val="00B050"/>
+                <a:schemeClr val="bg1">
+                  <a:lumMod val="65000"/>
+                </a:schemeClr>
               </a:solidFill>
             </a:endParaRPr>
           </a:p>
@@ -4083,7 +4039,9 @@
             <a:r>
               <a:rPr lang="en-GB" b="1" i="0" u="none" strike="noStrike" dirty="0">
                 <a:solidFill>
-                  <a:srgbClr val="00B050"/>
+                  <a:schemeClr val="bg1">
+                    <a:lumMod val="65000"/>
+                  </a:schemeClr>
                 </a:solidFill>
                 <a:effectLst/>
                 <a:latin typeface="SFMono-Regular"/>
@@ -4093,7 +4051,9 @@
             <a:r>
               <a:rPr lang="en-GB" b="1" i="0" u="none" strike="noStrike" dirty="0" err="1">
                 <a:solidFill>
-                  <a:srgbClr val="00B050"/>
+                  <a:schemeClr val="bg1">
+                    <a:lumMod val="65000"/>
+                  </a:schemeClr>
                 </a:solidFill>
                 <a:effectLst/>
                 <a:latin typeface="SFMono-Regular"/>
@@ -4103,7 +4063,9 @@
             <a:r>
               <a:rPr lang="en-GB" b="1" i="0" u="none" strike="noStrike" dirty="0">
                 <a:solidFill>
-                  <a:srgbClr val="00B050"/>
+                  <a:schemeClr val="bg1">
+                    <a:lumMod val="65000"/>
+                  </a:schemeClr>
                 </a:solidFill>
                 <a:effectLst/>
                 <a:latin typeface="SFMono-Regular"/>
@@ -4112,7 +4074,9 @@
             </a:r>
             <a:endParaRPr lang="en-CH" b="1" dirty="0">
               <a:solidFill>
-                <a:srgbClr val="00B050"/>
+                <a:schemeClr val="bg1">
+                  <a:lumMod val="65000"/>
+                </a:schemeClr>
               </a:solidFill>
             </a:endParaRPr>
           </a:p>
@@ -4132,7 +4096,7 @@
         </p:nvSpPr>
         <p:spPr>
           <a:xfrm>
-            <a:off x="8157692" y="3968181"/>
+            <a:off x="4052595" y="3065339"/>
             <a:ext cx="2073272" cy="369332"/>
           </a:xfrm>
           <a:prstGeom prst="rect">
@@ -4149,7 +4113,9 @@
             <a:r>
               <a:rPr lang="en-GB" dirty="0">
                 <a:solidFill>
-                  <a:srgbClr val="C00000"/>
+                  <a:schemeClr val="bg1">
+                    <a:lumMod val="65000"/>
+                  </a:schemeClr>
                 </a:solidFill>
               </a:rPr>
               <a:t>F</a:t>
@@ -4157,11 +4123,137 @@
             <a:r>
               <a:rPr lang="en-CH" dirty="0">
                 <a:solidFill>
-                  <a:srgbClr val="C00000"/>
+                  <a:schemeClr val="bg1">
+                    <a:lumMod val="65000"/>
+                  </a:schemeClr>
                 </a:solidFill>
               </a:rPr>
-              <a:t>ind check failed</a:t>
-            </a:r>
+              <a:t>ind checks failed</a:t>
+            </a:r>
+          </a:p>
+        </p:txBody>
+      </p:sp>
+      <p:cxnSp>
+        <p:nvCxnSpPr>
+          <p:cNvPr id="24" name="Straight Arrow Connector 23">
+            <a:extLst>
+              <a:ext uri="{FF2B5EF4-FFF2-40B4-BE49-F238E27FC236}">
+                <a16:creationId xmlns:a16="http://schemas.microsoft.com/office/drawing/2014/main" id="{2CC99E09-DE41-3B40-BBE4-217A888221E1}"/>
+              </a:ext>
+            </a:extLst>
+          </p:cNvPr>
+          <p:cNvCxnSpPr>
+            <a:cxnSpLocks/>
+            <a:stCxn id="22" idx="0"/>
+          </p:cNvCxnSpPr>
+          <p:nvPr/>
+        </p:nvCxnSpPr>
+        <p:spPr>
+          <a:xfrm flipH="1" flipV="1">
+            <a:off x="6169502" y="2873811"/>
+            <a:ext cx="10940" cy="1893792"/>
+          </a:xfrm>
+          <a:prstGeom prst="straightConnector1">
+            <a:avLst/>
+          </a:prstGeom>
+          <a:ln w="38100">
+            <a:solidFill>
+              <a:schemeClr val="bg1">
+                <a:lumMod val="65000"/>
+              </a:schemeClr>
+            </a:solidFill>
+            <a:tailEnd type="triangle"/>
+          </a:ln>
+        </p:spPr>
+        <p:style>
+          <a:lnRef idx="1">
+            <a:schemeClr val="accent1"/>
+          </a:lnRef>
+          <a:fillRef idx="0">
+            <a:schemeClr val="accent1"/>
+          </a:fillRef>
+          <a:effectRef idx="0">
+            <a:schemeClr val="accent1"/>
+          </a:effectRef>
+          <a:fontRef idx="minor">
+            <a:schemeClr val="tx1"/>
+          </a:fontRef>
+        </p:style>
+      </p:cxnSp>
+      <p:sp>
+        <p:nvSpPr>
+          <p:cNvPr id="28" name="TextBox 27">
+            <a:extLst>
+              <a:ext uri="{FF2B5EF4-FFF2-40B4-BE49-F238E27FC236}">
+                <a16:creationId xmlns:a16="http://schemas.microsoft.com/office/drawing/2014/main" id="{21D548A9-C8FA-0E4C-B48D-C2C4D70EDB2A}"/>
+              </a:ext>
+            </a:extLst>
+          </p:cNvPr>
+          <p:cNvSpPr txBox="1"/>
+          <p:nvPr/>
+        </p:nvSpPr>
+        <p:spPr>
+          <a:xfrm>
+            <a:off x="6244621" y="3117102"/>
+            <a:ext cx="219318" cy="369332"/>
+          </a:xfrm>
+          <a:prstGeom prst="rect">
+            <a:avLst/>
+          </a:prstGeom>
+          <a:noFill/>
+        </p:spPr>
+        <p:txBody>
+          <a:bodyPr wrap="square" rtlCol="0">
+            <a:spAutoFit/>
+          </a:bodyPr>
+          <a:lstStyle/>
+          <a:p>
+            <a:r>
+              <a:rPr lang="en-CH" b="1" dirty="0">
+                <a:solidFill>
+                  <a:schemeClr val="bg1">
+                    <a:lumMod val="65000"/>
+                  </a:schemeClr>
+                </a:solidFill>
+              </a:rPr>
+              <a:t>?</a:t>
+            </a:r>
+          </a:p>
+        </p:txBody>
+      </p:sp>
+      <p:sp>
+        <p:nvSpPr>
+          <p:cNvPr id="29" name="TextBox 28">
+            <a:extLst>
+              <a:ext uri="{FF2B5EF4-FFF2-40B4-BE49-F238E27FC236}">
+                <a16:creationId xmlns:a16="http://schemas.microsoft.com/office/drawing/2014/main" id="{9067740E-EEBF-9D4F-8F37-D3BE9A3025E6}"/>
+              </a:ext>
+            </a:extLst>
+          </p:cNvPr>
+          <p:cNvSpPr txBox="1"/>
+          <p:nvPr/>
+        </p:nvSpPr>
+        <p:spPr>
+          <a:xfrm>
+            <a:off x="8144008" y="3841577"/>
+            <a:ext cx="1036636" cy="369332"/>
+          </a:xfrm>
+          <a:prstGeom prst="rect">
+            <a:avLst/>
+          </a:prstGeom>
+          <a:noFill/>
+        </p:spPr>
+        <p:txBody>
+          <a:bodyPr wrap="square" rtlCol="0">
+            <a:spAutoFit/>
+          </a:bodyPr>
+          <a:lstStyle/>
+          <a:p>
+            <a:r>
+              <a:rPr lang="de-CH" b="1" dirty="0" err="1"/>
+              <a:t>success</a:t>
+            </a:r>
+            <a:endParaRPr lang="en-CH" b="1" dirty="0"/>
           </a:p>
         </p:txBody>
       </p:sp>

</xml_diff>